<commit_message>
l4: p: contents page
</commit_message>
<xml_diff>
--- a/project/presentation/stars_galaxies.pptx
+++ b/project/presentation/stars_galaxies.pptx
@@ -108,6 +108,11 @@
       </a:defRPr>
     </a:lvl9pPr>
   </p:defaultTextStyle>
+  <p:extLst>
+    <p:ext uri="{EFAFB233-063F-42B5-8137-9DF3F51BA10A}">
+      <p15:sldGuideLst xmlns:p15="http://schemas.microsoft.com/office/powerpoint/2012/main"/>
+    </p:ext>
+  </p:extLst>
 </p:presentation>
 </file>
 
@@ -193,7 +198,7 @@
           <a:p>
             <a:fld id="{B42938C6-E08C-7D41-9217-0771C2C3F712}" type="datetimeFigureOut">
               <a:rPr lang="en-GB" smtClean="0"/>
-              <a:t>18/02/2019</a:t>
+              <a:t>19/02/2019</a:t>
             </a:fld>
             <a:endParaRPr lang="en-GB"/>
           </a:p>
@@ -592,7 +597,7 @@
           <a:p>
             <a:fld id="{9F791849-BC05-F242-9028-B1E624466C5A}" type="datetime1">
               <a:rPr lang="en-GB" smtClean="0"/>
-              <a:t>18/02/2019</a:t>
+              <a:t>19/02/2019</a:t>
             </a:fld>
             <a:endParaRPr lang="en-GB"/>
           </a:p>
@@ -762,7 +767,7 @@
           <a:p>
             <a:fld id="{29D86058-FB40-A64F-8E86-23CF5C098BBC}" type="datetime1">
               <a:rPr lang="en-GB" smtClean="0"/>
-              <a:t>18/02/2019</a:t>
+              <a:t>19/02/2019</a:t>
             </a:fld>
             <a:endParaRPr lang="en-GB"/>
           </a:p>
@@ -942,7 +947,7 @@
           <a:p>
             <a:fld id="{D7218855-2C79-C54C-B317-B1A3C6ED019A}" type="datetime1">
               <a:rPr lang="en-GB" smtClean="0"/>
-              <a:t>18/02/2019</a:t>
+              <a:t>19/02/2019</a:t>
             </a:fld>
             <a:endParaRPr lang="en-GB"/>
           </a:p>
@@ -1112,7 +1117,7 @@
           <a:p>
             <a:fld id="{ACAE5203-B363-9B48-8E79-C9A8AABC4038}" type="datetime1">
               <a:rPr lang="en-GB" smtClean="0"/>
-              <a:t>18/02/2019</a:t>
+              <a:t>19/02/2019</a:t>
             </a:fld>
             <a:endParaRPr lang="en-GB"/>
           </a:p>
@@ -1358,7 +1363,7 @@
           <a:p>
             <a:fld id="{165C5C84-928D-9742-ABCE-BFBD60792C04}" type="datetime1">
               <a:rPr lang="en-GB" smtClean="0"/>
-              <a:t>18/02/2019</a:t>
+              <a:t>19/02/2019</a:t>
             </a:fld>
             <a:endParaRPr lang="en-GB"/>
           </a:p>
@@ -1590,7 +1595,7 @@
           <a:p>
             <a:fld id="{B97DE687-E1D5-454C-93E4-6F5390968CAB}" type="datetime1">
               <a:rPr lang="en-GB" smtClean="0"/>
-              <a:t>18/02/2019</a:t>
+              <a:t>19/02/2019</a:t>
             </a:fld>
             <a:endParaRPr lang="en-GB"/>
           </a:p>
@@ -1957,7 +1962,7 @@
           <a:p>
             <a:fld id="{286C824A-BDD5-0649-8DE8-4454E8647568}" type="datetime1">
               <a:rPr lang="en-GB" smtClean="0"/>
-              <a:t>18/02/2019</a:t>
+              <a:t>19/02/2019</a:t>
             </a:fld>
             <a:endParaRPr lang="en-GB"/>
           </a:p>
@@ -2075,7 +2080,7 @@
           <a:p>
             <a:fld id="{FF9DD4DA-2064-9B4E-9AD7-444576755AB1}" type="datetime1">
               <a:rPr lang="en-GB" smtClean="0"/>
-              <a:t>18/02/2019</a:t>
+              <a:t>19/02/2019</a:t>
             </a:fld>
             <a:endParaRPr lang="en-GB"/>
           </a:p>
@@ -2170,7 +2175,7 @@
           <a:p>
             <a:fld id="{26447809-0508-804A-9E6F-1B4121DD0704}" type="datetime1">
               <a:rPr lang="en-GB" smtClean="0"/>
-              <a:t>18/02/2019</a:t>
+              <a:t>19/02/2019</a:t>
             </a:fld>
             <a:endParaRPr lang="en-GB"/>
           </a:p>
@@ -2447,7 +2452,7 @@
           <a:p>
             <a:fld id="{32DAE4FB-C3C9-D944-A7E2-66EAB7B70D58}" type="datetime1">
               <a:rPr lang="en-GB" smtClean="0"/>
-              <a:t>18/02/2019</a:t>
+              <a:t>19/02/2019</a:t>
             </a:fld>
             <a:endParaRPr lang="en-GB"/>
           </a:p>
@@ -2704,7 +2709,7 @@
           <a:p>
             <a:fld id="{FE8EA9C9-ACCF-3047-8BC9-D83F512A723F}" type="datetime1">
               <a:rPr lang="en-GB" smtClean="0"/>
-              <a:t>18/02/2019</a:t>
+              <a:t>19/02/2019</a:t>
             </a:fld>
             <a:endParaRPr lang="en-GB"/>
           </a:p>
@@ -2917,7 +2922,7 @@
           <a:p>
             <a:fld id="{559419AF-4041-D641-92CE-18D361728CB4}" type="datetime1">
               <a:rPr lang="en-GB" smtClean="0"/>
-              <a:t>18/02/2019</a:t>
+              <a:t>19/02/2019</a:t>
             </a:fld>
             <a:endParaRPr lang="en-GB"/>
           </a:p>
@@ -3924,6 +3929,10 @@
           <a:bodyPr/>
           <a:lstStyle/>
           <a:p>
+            <a:r>
+              <a:rPr lang="en-GB"/>
+              <a:t>Contents</a:t>
+            </a:r>
             <a:endParaRPr lang="en-GB" dirty="0"/>
           </a:p>
         </p:txBody>

</xml_diff>

<commit_message>
l4: probably going to use keynote
</commit_message>
<xml_diff>
--- a/project/presentation/stars_galaxies.pptx
+++ b/project/presentation/stars_galaxies.pptx
@@ -198,7 +198,7 @@
           <a:p>
             <a:fld id="{B42938C6-E08C-7D41-9217-0771C2C3F712}" type="datetimeFigureOut">
               <a:rPr lang="en-GB" smtClean="0"/>
-              <a:t>19/02/2019</a:t>
+              <a:t>20/02/2019</a:t>
             </a:fld>
             <a:endParaRPr lang="en-GB"/>
           </a:p>
@@ -597,7 +597,7 @@
           <a:p>
             <a:fld id="{9F791849-BC05-F242-9028-B1E624466C5A}" type="datetime1">
               <a:rPr lang="en-GB" smtClean="0"/>
-              <a:t>19/02/2019</a:t>
+              <a:t>20/02/2019</a:t>
             </a:fld>
             <a:endParaRPr lang="en-GB"/>
           </a:p>
@@ -767,7 +767,7 @@
           <a:p>
             <a:fld id="{29D86058-FB40-A64F-8E86-23CF5C098BBC}" type="datetime1">
               <a:rPr lang="en-GB" smtClean="0"/>
-              <a:t>19/02/2019</a:t>
+              <a:t>20/02/2019</a:t>
             </a:fld>
             <a:endParaRPr lang="en-GB"/>
           </a:p>
@@ -947,7 +947,7 @@
           <a:p>
             <a:fld id="{D7218855-2C79-C54C-B317-B1A3C6ED019A}" type="datetime1">
               <a:rPr lang="en-GB" smtClean="0"/>
-              <a:t>19/02/2019</a:t>
+              <a:t>20/02/2019</a:t>
             </a:fld>
             <a:endParaRPr lang="en-GB"/>
           </a:p>
@@ -1117,7 +1117,7 @@
           <a:p>
             <a:fld id="{ACAE5203-B363-9B48-8E79-C9A8AABC4038}" type="datetime1">
               <a:rPr lang="en-GB" smtClean="0"/>
-              <a:t>19/02/2019</a:t>
+              <a:t>20/02/2019</a:t>
             </a:fld>
             <a:endParaRPr lang="en-GB"/>
           </a:p>
@@ -1363,7 +1363,7 @@
           <a:p>
             <a:fld id="{165C5C84-928D-9742-ABCE-BFBD60792C04}" type="datetime1">
               <a:rPr lang="en-GB" smtClean="0"/>
-              <a:t>19/02/2019</a:t>
+              <a:t>20/02/2019</a:t>
             </a:fld>
             <a:endParaRPr lang="en-GB"/>
           </a:p>
@@ -1595,7 +1595,7 @@
           <a:p>
             <a:fld id="{B97DE687-E1D5-454C-93E4-6F5390968CAB}" type="datetime1">
               <a:rPr lang="en-GB" smtClean="0"/>
-              <a:t>19/02/2019</a:t>
+              <a:t>20/02/2019</a:t>
             </a:fld>
             <a:endParaRPr lang="en-GB"/>
           </a:p>
@@ -1962,7 +1962,7 @@
           <a:p>
             <a:fld id="{286C824A-BDD5-0649-8DE8-4454E8647568}" type="datetime1">
               <a:rPr lang="en-GB" smtClean="0"/>
-              <a:t>19/02/2019</a:t>
+              <a:t>20/02/2019</a:t>
             </a:fld>
             <a:endParaRPr lang="en-GB"/>
           </a:p>
@@ -2080,7 +2080,7 @@
           <a:p>
             <a:fld id="{FF9DD4DA-2064-9B4E-9AD7-444576755AB1}" type="datetime1">
               <a:rPr lang="en-GB" smtClean="0"/>
-              <a:t>19/02/2019</a:t>
+              <a:t>20/02/2019</a:t>
             </a:fld>
             <a:endParaRPr lang="en-GB"/>
           </a:p>
@@ -2175,7 +2175,7 @@
           <a:p>
             <a:fld id="{26447809-0508-804A-9E6F-1B4121DD0704}" type="datetime1">
               <a:rPr lang="en-GB" smtClean="0"/>
-              <a:t>19/02/2019</a:t>
+              <a:t>20/02/2019</a:t>
             </a:fld>
             <a:endParaRPr lang="en-GB"/>
           </a:p>
@@ -2452,7 +2452,7 @@
           <a:p>
             <a:fld id="{32DAE4FB-C3C9-D944-A7E2-66EAB7B70D58}" type="datetime1">
               <a:rPr lang="en-GB" smtClean="0"/>
-              <a:t>19/02/2019</a:t>
+              <a:t>20/02/2019</a:t>
             </a:fld>
             <a:endParaRPr lang="en-GB"/>
           </a:p>
@@ -2709,7 +2709,7 @@
           <a:p>
             <a:fld id="{FE8EA9C9-ACCF-3047-8BC9-D83F512A723F}" type="datetime1">
               <a:rPr lang="en-GB" smtClean="0"/>
-              <a:t>19/02/2019</a:t>
+              <a:t>20/02/2019</a:t>
             </a:fld>
             <a:endParaRPr lang="en-GB"/>
           </a:p>
@@ -2922,7 +2922,7 @@
           <a:p>
             <a:fld id="{559419AF-4041-D641-92CE-18D361728CB4}" type="datetime1">
               <a:rPr lang="en-GB" smtClean="0"/>
-              <a:t>19/02/2019</a:t>
+              <a:t>20/02/2019</a:t>
             </a:fld>
             <a:endParaRPr lang="en-GB"/>
           </a:p>
@@ -3930,10 +3930,9 @@
           <a:lstStyle/>
           <a:p>
             <a:r>
-              <a:rPr lang="en-GB"/>
-              <a:t>Contents</a:t>
-            </a:r>
-            <a:endParaRPr lang="en-GB" dirty="0"/>
+              <a:rPr lang="en-GB" dirty="0"/>
+              <a:t>Introduction</a:t>
+            </a:r>
           </a:p>
         </p:txBody>
       </p:sp>

</xml_diff>